<commit_message>
Finalized the presentation slides and the notebook
</commit_message>
<xml_diff>
--- a/presentation/week13_final_presentation.pptx
+++ b/presentation/week13_final_presentation.pptx
@@ -1063,7 +1063,7 @@
   <p:cSld>
     <p:spTree>
       <p:nvGrpSpPr>
-        <p:cNvPr id="173" name="Shape 173"/>
+        <p:cNvPr id="174" name="Shape 174"/>
         <p:cNvGrpSpPr/>
         <p:nvPr/>
       </p:nvGrpSpPr>
@@ -1077,7 +1077,7 @@
       </p:grpSpPr>
       <p:sp>
         <p:nvSpPr>
-          <p:cNvPr id="174" name="Google Shape;174;p11:notes"/>
+          <p:cNvPr id="175" name="Google Shape;175;p11:notes"/>
           <p:cNvSpPr txBox="1"/>
           <p:nvPr>
             <p:ph idx="1" type="body"/>
@@ -1124,7 +1124,7 @@
       </p:sp>
       <p:sp>
         <p:nvSpPr>
-          <p:cNvPr id="175" name="Google Shape;175;p11:notes"/>
+          <p:cNvPr id="176" name="Google Shape;176;p11:notes"/>
           <p:cNvSpPr/>
           <p:nvPr>
             <p:ph idx="2" type="sldImg"/>
@@ -1180,7 +1180,7 @@
   <p:cSld>
     <p:spTree>
       <p:nvGrpSpPr>
-        <p:cNvPr id="182" name="Shape 182"/>
+        <p:cNvPr id="183" name="Shape 183"/>
         <p:cNvGrpSpPr/>
         <p:nvPr/>
       </p:nvGrpSpPr>
@@ -1194,7 +1194,7 @@
       </p:grpSpPr>
       <p:sp>
         <p:nvSpPr>
-          <p:cNvPr id="183" name="Google Shape;183;p12:notes"/>
+          <p:cNvPr id="184" name="Google Shape;184;p12:notes"/>
           <p:cNvSpPr txBox="1"/>
           <p:nvPr>
             <p:ph idx="1" type="body"/>
@@ -1241,7 +1241,7 @@
       </p:sp>
       <p:sp>
         <p:nvSpPr>
-          <p:cNvPr id="184" name="Google Shape;184;p12:notes"/>
+          <p:cNvPr id="185" name="Google Shape;185;p12:notes"/>
           <p:cNvSpPr/>
           <p:nvPr>
             <p:ph idx="2" type="sldImg"/>
@@ -1297,7 +1297,7 @@
   <p:cSld>
     <p:spTree>
       <p:nvGrpSpPr>
-        <p:cNvPr id="191" name="Shape 191"/>
+        <p:cNvPr id="192" name="Shape 192"/>
         <p:cNvGrpSpPr/>
         <p:nvPr/>
       </p:nvGrpSpPr>
@@ -1311,7 +1311,7 @@
       </p:grpSpPr>
       <p:sp>
         <p:nvSpPr>
-          <p:cNvPr id="192" name="Google Shape;192;p13:notes"/>
+          <p:cNvPr id="193" name="Google Shape;193;p13:notes"/>
           <p:cNvSpPr txBox="1"/>
           <p:nvPr>
             <p:ph idx="1" type="body"/>
@@ -1358,7 +1358,7 @@
       </p:sp>
       <p:sp>
         <p:nvSpPr>
-          <p:cNvPr id="193" name="Google Shape;193;p13:notes"/>
+          <p:cNvPr id="194" name="Google Shape;194;p13:notes"/>
           <p:cNvSpPr/>
           <p:nvPr>
             <p:ph idx="2" type="sldImg"/>
@@ -16526,8 +16526,35 @@
           <p:cNvPicPr preferRelativeResize="0"/>
           <p:nvPr/>
         </p:nvPicPr>
+        <p:blipFill rotWithShape="1">
+          <a:blip r:embed="rId4">
+            <a:alphaModFix/>
+          </a:blip>
+          <a:srcRect b="0" l="0" r="0" t="0"/>
+          <a:stretch/>
+        </p:blipFill>
+        <p:spPr>
+          <a:xfrm>
+            <a:off x="355000" y="2958551"/>
+            <a:ext cx="3473800" cy="1109375"/>
+          </a:xfrm>
+          <a:prstGeom prst="rect">
+            <a:avLst/>
+          </a:prstGeom>
+          <a:noFill/>
+          <a:ln>
+            <a:noFill/>
+          </a:ln>
+        </p:spPr>
+      </p:pic>
+      <p:pic>
+        <p:nvPicPr>
+          <p:cNvPr id="173" name="Google Shape;173;p22"/>
+          <p:cNvPicPr preferRelativeResize="0"/>
+          <p:nvPr/>
+        </p:nvPicPr>
         <p:blipFill>
-          <a:blip r:embed="rId4">
+          <a:blip r:embed="rId5">
             <a:alphaModFix/>
           </a:blip>
           <a:stretch>
@@ -16536,8 +16563,8 @@
         </p:blipFill>
         <p:spPr>
           <a:xfrm>
-            <a:off x="355000" y="2958551"/>
-            <a:ext cx="3473800" cy="1109375"/>
+            <a:off x="4868300" y="4863422"/>
+            <a:ext cx="5972175" cy="942975"/>
           </a:xfrm>
           <a:prstGeom prst="rect">
             <a:avLst/>
@@ -16561,7 +16588,7 @@
   <p:cSld>
     <p:spTree>
       <p:nvGrpSpPr>
-        <p:cNvPr id="176" name="Shape 176"/>
+        <p:cNvPr id="177" name="Shape 177"/>
         <p:cNvGrpSpPr/>
         <p:nvPr/>
       </p:nvGrpSpPr>
@@ -16575,7 +16602,7 @@
       </p:grpSpPr>
       <p:sp>
         <p:nvSpPr>
-          <p:cNvPr id="177" name="Google Shape;177;p23"/>
+          <p:cNvPr id="178" name="Google Shape;178;p23"/>
           <p:cNvSpPr txBox="1"/>
           <p:nvPr/>
         </p:nvSpPr>
@@ -16756,7 +16783,7 @@
       </p:sp>
       <p:sp>
         <p:nvSpPr>
-          <p:cNvPr id="178" name="Google Shape;178;p23"/>
+          <p:cNvPr id="179" name="Google Shape;179;p23"/>
           <p:cNvSpPr/>
           <p:nvPr/>
         </p:nvSpPr>
@@ -16821,7 +16848,7 @@
       </p:sp>
       <p:sp>
         <p:nvSpPr>
-          <p:cNvPr id="179" name="Google Shape;179;p23"/>
+          <p:cNvPr id="180" name="Google Shape;180;p23"/>
           <p:cNvSpPr txBox="1"/>
           <p:nvPr>
             <p:ph type="title"/>
@@ -16877,7 +16904,7 @@
       </p:sp>
       <p:sp>
         <p:nvSpPr>
-          <p:cNvPr id="180" name="Google Shape;180;p23"/>
+          <p:cNvPr id="181" name="Google Shape;181;p23"/>
           <p:cNvSpPr txBox="1"/>
           <p:nvPr/>
         </p:nvSpPr>
@@ -16934,7 +16961,7 @@
       </p:sp>
       <p:sp>
         <p:nvSpPr>
-          <p:cNvPr id="181" name="Google Shape;181;p23"/>
+          <p:cNvPr id="182" name="Google Shape;182;p23"/>
           <p:cNvSpPr txBox="1"/>
           <p:nvPr/>
         </p:nvSpPr>
@@ -16996,7 +17023,7 @@
                 <a:cs typeface="Calibri"/>
                 <a:sym typeface="Calibri"/>
               </a:rPr>
-              <a:t>Random Forest Classifier</a:t>
+              <a:t>Logistic Regression</a:t>
             </a:r>
             <a:r>
               <a:rPr b="0" i="0" lang="en-US" sz="1800" u="none" cap="none" strike="noStrike">
@@ -17134,8 +17161,56 @@
               <a:t>Highest F1-score of </a:t>
             </a:r>
             <a:r>
+              <a:rPr b="0" i="0" lang="en-US" sz="1800" u="none" cap="none" strike="noStrike">
+                <a:solidFill>
+                  <a:srgbClr val="C00000"/>
+                </a:solidFill>
+                <a:latin typeface="Calibri"/>
+                <a:ea typeface="Calibri"/>
+                <a:cs typeface="Calibri"/>
+                <a:sym typeface="Calibri"/>
+              </a:rPr>
+              <a:t>87% </a:t>
+            </a:r>
+            <a:r>
+              <a:rPr b="0" i="0" lang="en-US" sz="1800" u="none" cap="none" strike="noStrike">
+                <a:solidFill>
+                  <a:schemeClr val="dk1"/>
+                </a:solidFill>
+                <a:latin typeface="Calibri"/>
+                <a:ea typeface="Calibri"/>
+                <a:cs typeface="Calibri"/>
+                <a:sym typeface="Calibri"/>
+              </a:rPr>
+              <a:t>where for </a:t>
+            </a:r>
+            <a:r>
               <a:rPr lang="en-US" sz="1800">
                 <a:solidFill>
+                  <a:schemeClr val="dk1"/>
+                </a:solidFill>
+                <a:latin typeface="Calibri"/>
+                <a:ea typeface="Calibri"/>
+                <a:cs typeface="Calibri"/>
+                <a:sym typeface="Calibri"/>
+              </a:rPr>
+              <a:t>Random Forest Classifier</a:t>
+            </a:r>
+            <a:r>
+              <a:rPr b="0" i="0" lang="en-US" sz="1800" u="none" cap="none" strike="noStrike">
+                <a:solidFill>
+                  <a:schemeClr val="dk1"/>
+                </a:solidFill>
+                <a:latin typeface="Calibri"/>
+                <a:ea typeface="Calibri"/>
+                <a:cs typeface="Calibri"/>
+                <a:sym typeface="Calibri"/>
+              </a:rPr>
+              <a:t> the FI-score is </a:t>
+            </a:r>
+            <a:r>
+              <a:rPr lang="en-US" sz="1800">
+                <a:solidFill>
                   <a:srgbClr val="C00000"/>
                 </a:solidFill>
                 <a:latin typeface="Calibri"/>
@@ -17143,58 +17218,10 @@
                 <a:cs typeface="Calibri"/>
                 <a:sym typeface="Calibri"/>
               </a:rPr>
-              <a:t>86.9% or 87% </a:t>
-            </a:r>
-            <a:r>
-              <a:rPr lang="en-US" sz="1800">
-                <a:solidFill>
-                  <a:schemeClr val="dk1"/>
-                </a:solidFill>
-                <a:latin typeface="Calibri"/>
-                <a:ea typeface="Calibri"/>
-                <a:cs typeface="Calibri"/>
-                <a:sym typeface="Calibri"/>
-              </a:rPr>
-              <a:t>where for Logistic Regression the FI-score is </a:t>
-            </a:r>
-            <a:r>
-              <a:rPr lang="en-US" sz="1800">
-                <a:solidFill>
-                  <a:schemeClr val="dk1"/>
-                </a:solidFill>
-                <a:latin typeface="Calibri"/>
-                <a:ea typeface="Calibri"/>
-                <a:cs typeface="Calibri"/>
-                <a:sym typeface="Calibri"/>
-              </a:rPr>
-              <a:t>((0.94+0.32)/2) or</a:t>
-            </a:r>
-            <a:r>
-              <a:rPr lang="en-US" sz="1800">
-                <a:solidFill>
-                  <a:schemeClr val="dk1"/>
-                </a:solidFill>
-                <a:latin typeface="Calibri"/>
-                <a:ea typeface="Calibri"/>
-                <a:cs typeface="Calibri"/>
-                <a:sym typeface="Calibri"/>
-              </a:rPr>
-              <a:t> </a:t>
-            </a:r>
-            <a:r>
-              <a:rPr lang="en-US" sz="1800">
-                <a:solidFill>
-                  <a:srgbClr val="C00000"/>
-                </a:solidFill>
-                <a:latin typeface="Calibri"/>
-                <a:ea typeface="Calibri"/>
-                <a:cs typeface="Calibri"/>
-                <a:sym typeface="Calibri"/>
-              </a:rPr>
-              <a:t>63</a:t>
-            </a:r>
-            <a:r>
-              <a:rPr lang="en-US" sz="1800">
+              <a:t>86.9</a:t>
+            </a:r>
+            <a:r>
+              <a:rPr b="0" i="0" lang="en-US" sz="1800" u="none" cap="none" strike="noStrike">
                 <a:solidFill>
                   <a:srgbClr val="C00000"/>
                 </a:solidFill>
@@ -17206,7 +17233,7 @@
               <a:t>%</a:t>
             </a:r>
             <a:r>
-              <a:rPr lang="en-US" sz="1800">
+              <a:rPr b="0" i="0" lang="en-US" sz="1800" u="none" cap="none" strike="noStrike">
                 <a:solidFill>
                   <a:schemeClr val="dk1"/>
                 </a:solidFill>
@@ -17246,7 +17273,7 @@
               <a:buChar char="•"/>
             </a:pPr>
             <a:r>
-              <a:rPr lang="en-US" sz="1800">
+              <a:rPr b="0" i="0" lang="en-US" sz="1800" u="none" cap="none" strike="noStrike">
                 <a:solidFill>
                   <a:schemeClr val="dk1"/>
                 </a:solidFill>
@@ -17255,19 +17282,7 @@
                 <a:cs typeface="Calibri"/>
                 <a:sym typeface="Calibri"/>
               </a:rPr>
-              <a:t>The Second </a:t>
-            </a:r>
-            <a:r>
-              <a:rPr b="0" i="0" lang="en-US" sz="1800" u="none" cap="none" strike="noStrike">
-                <a:solidFill>
-                  <a:schemeClr val="dk1"/>
-                </a:solidFill>
-                <a:latin typeface="Calibri"/>
-                <a:ea typeface="Calibri"/>
-                <a:cs typeface="Calibri"/>
-                <a:sym typeface="Calibri"/>
-              </a:rPr>
-              <a:t>Highest accuracy of </a:t>
+              <a:t>The Highest accuracy of </a:t>
             </a:r>
             <a:r>
               <a:rPr b="0" i="0" lang="en-US" sz="1800" u="none" cap="none" strike="noStrike">
@@ -17291,7 +17306,7 @@
                 <a:cs typeface="Calibri"/>
                 <a:sym typeface="Calibri"/>
               </a:rPr>
-              <a:t>8.38</a:t>
+              <a:t>9</a:t>
             </a:r>
             <a:r>
               <a:rPr b="0" i="0" lang="en-US" sz="1800" u="none" cap="none" strike="noStrike">
@@ -17327,7 +17342,7 @@
                 <a:cs typeface="Calibri"/>
                 <a:sym typeface="Calibri"/>
               </a:rPr>
-              <a:t>less</a:t>
+              <a:t>higher</a:t>
             </a:r>
             <a:r>
               <a:rPr b="0" i="0" lang="en-US" sz="1800" u="none" cap="none" strike="noStrike">
@@ -17351,7 +17366,7 @@
                 <a:cs typeface="Calibri"/>
                 <a:sym typeface="Calibri"/>
               </a:rPr>
-              <a:t>Logistic Regression</a:t>
+              <a:t>Random Forest Classifier</a:t>
             </a:r>
             <a:r>
               <a:rPr b="0" i="0" lang="en-US" sz="1800" u="none" cap="none" strike="noStrike">
@@ -17387,7 +17402,7 @@
                 <a:cs typeface="Calibri"/>
                 <a:sym typeface="Calibri"/>
               </a:rPr>
-              <a:t>9</a:t>
+              <a:t>8.38</a:t>
             </a:r>
             <a:r>
               <a:rPr b="0" i="0" lang="en-US" sz="1800" u="none" cap="none" strike="noStrike">
@@ -17634,7 +17649,7 @@
                 <a:cs typeface="Calibri"/>
                 <a:sym typeface="Calibri"/>
               </a:rPr>
-              <a:t>Random Forest Classifier</a:t>
+              <a:t>Logistic Regression</a:t>
             </a:r>
             <a:r>
               <a:rPr b="0" i="0" lang="en-US" sz="1800" u="none" cap="none" strike="noStrike">
@@ -17747,7 +17762,7 @@
   <p:cSld>
     <p:spTree>
       <p:nvGrpSpPr>
-        <p:cNvPr id="185" name="Shape 185"/>
+        <p:cNvPr id="186" name="Shape 186"/>
         <p:cNvGrpSpPr/>
         <p:nvPr/>
       </p:nvGrpSpPr>
@@ -17761,7 +17776,7 @@
       </p:grpSpPr>
       <p:sp>
         <p:nvSpPr>
-          <p:cNvPr id="186" name="Google Shape;186;p24"/>
+          <p:cNvPr id="187" name="Google Shape;187;p24"/>
           <p:cNvSpPr txBox="1"/>
           <p:nvPr/>
         </p:nvSpPr>
@@ -17942,7 +17957,7 @@
       </p:sp>
       <p:sp>
         <p:nvSpPr>
-          <p:cNvPr id="187" name="Google Shape;187;p24"/>
+          <p:cNvPr id="188" name="Google Shape;188;p24"/>
           <p:cNvSpPr/>
           <p:nvPr/>
         </p:nvSpPr>
@@ -18007,7 +18022,7 @@
       </p:sp>
       <p:sp>
         <p:nvSpPr>
-          <p:cNvPr id="188" name="Google Shape;188;p24"/>
+          <p:cNvPr id="189" name="Google Shape;189;p24"/>
           <p:cNvSpPr txBox="1"/>
           <p:nvPr>
             <p:ph type="title"/>
@@ -18063,7 +18078,7 @@
       </p:sp>
       <p:sp>
         <p:nvSpPr>
-          <p:cNvPr id="189" name="Google Shape;189;p24"/>
+          <p:cNvPr id="190" name="Google Shape;190;p24"/>
           <p:cNvSpPr txBox="1"/>
           <p:nvPr/>
         </p:nvSpPr>
@@ -18120,7 +18135,7 @@
       </p:sp>
       <p:sp>
         <p:nvSpPr>
-          <p:cNvPr id="190" name="Google Shape;190;p24"/>
+          <p:cNvPr id="191" name="Google Shape;191;p24"/>
           <p:cNvSpPr txBox="1"/>
           <p:nvPr/>
         </p:nvSpPr>
@@ -18329,7 +18344,7 @@
                 <a:cs typeface="Calibri"/>
                 <a:sym typeface="Calibri"/>
               </a:rPr>
-              <a:t>Random Forest Classifier</a:t>
+              <a:t>Logistic Regression</a:t>
             </a:r>
             <a:r>
               <a:rPr b="0" i="0" lang="en-US" sz="1800" u="none" cap="none" strike="noStrike">
@@ -18365,31 +18380,7 @@
                 <a:cs typeface="Calibri"/>
                 <a:sym typeface="Calibri"/>
               </a:rPr>
-              <a:t>0.</a:t>
-            </a:r>
-            <a:r>
-              <a:rPr lang="en-US" sz="1800">
-                <a:solidFill>
-                  <a:srgbClr val="C00000"/>
-                </a:solidFill>
-                <a:latin typeface="Calibri"/>
-                <a:ea typeface="Calibri"/>
-                <a:cs typeface="Calibri"/>
-                <a:sym typeface="Calibri"/>
-              </a:rPr>
-              <a:t>87</a:t>
-            </a:r>
-            <a:r>
-              <a:rPr b="0" i="0" lang="en-US" sz="1800" u="none" cap="none" strike="noStrike">
-                <a:solidFill>
-                  <a:srgbClr val="C00000"/>
-                </a:solidFill>
-                <a:latin typeface="Calibri"/>
-                <a:ea typeface="Calibri"/>
-                <a:cs typeface="Calibri"/>
-                <a:sym typeface="Calibri"/>
-              </a:rPr>
-              <a:t> </a:t>
+              <a:t>0.87 </a:t>
             </a:r>
             <a:r>
               <a:rPr b="0" i="0" lang="en-US" sz="1800" u="none" cap="none" strike="noStrike">
@@ -18413,7 +18404,7 @@
                 <a:cs typeface="Calibri"/>
                 <a:sym typeface="Calibri"/>
               </a:rPr>
-              <a:t>Logistic Regression</a:t>
+              <a:t>Random Forest Classifier</a:t>
             </a:r>
             <a:r>
               <a:rPr b="0" i="0" lang="en-US" sz="1800" u="none" cap="none" strike="noStrike">
@@ -18449,7 +18440,7 @@
                 <a:cs typeface="Calibri"/>
                 <a:sym typeface="Calibri"/>
               </a:rPr>
-              <a:t>63</a:t>
+              <a:t>869</a:t>
             </a:r>
             <a:endParaRPr b="0" i="0" sz="1800" u="none" cap="none" strike="noStrike">
               <a:solidFill>
@@ -18615,7 +18606,7 @@
               <a:t>ABC Bank should select </a:t>
             </a:r>
             <a:r>
-              <a:rPr lang="en-US" sz="1800">
+              <a:rPr b="0" i="0" lang="en-US" sz="1800" u="none" cap="none" strike="noStrike">
                 <a:solidFill>
                   <a:srgbClr val="C00000"/>
                 </a:solidFill>
@@ -18624,7 +18615,19 @@
                 <a:cs typeface="Calibri"/>
                 <a:sym typeface="Calibri"/>
               </a:rPr>
-              <a:t>Gradient Boosting Classifier</a:t>
+              <a:t>Gradient Boosting Classifier </a:t>
+            </a:r>
+            <a:r>
+              <a:rPr b="0" i="0" lang="en-US" sz="1800" u="none" cap="none" strike="noStrike">
+                <a:solidFill>
+                  <a:schemeClr val="dk1"/>
+                </a:solidFill>
+                <a:latin typeface="Calibri"/>
+                <a:ea typeface="Calibri"/>
+                <a:cs typeface="Calibri"/>
+                <a:sym typeface="Calibri"/>
+              </a:rPr>
+              <a:t>(for Bank-Full dataset) and</a:t>
             </a:r>
             <a:r>
               <a:rPr b="0" i="0" lang="en-US" sz="1800" u="none" cap="none" strike="noStrike">
@@ -18639,40 +18642,16 @@
               <a:t> </a:t>
             </a:r>
             <a:r>
-              <a:rPr b="0" i="0" lang="en-US" sz="1800" u="none" cap="none" strike="noStrike">
-                <a:solidFill>
-                  <a:schemeClr val="dk1"/>
+              <a:rPr lang="en-US" sz="1800">
+                <a:solidFill>
+                  <a:srgbClr val="C00000"/>
                 </a:solidFill>
                 <a:latin typeface="Calibri"/>
                 <a:ea typeface="Calibri"/>
                 <a:cs typeface="Calibri"/>
                 <a:sym typeface="Calibri"/>
               </a:rPr>
-              <a:t>(for Bank-Full dataset) and</a:t>
-            </a:r>
-            <a:r>
-              <a:rPr b="0" i="0" lang="en-US" sz="1800" u="none" cap="none" strike="noStrike">
-                <a:solidFill>
-                  <a:srgbClr val="C00000"/>
-                </a:solidFill>
-                <a:latin typeface="Calibri"/>
-                <a:ea typeface="Calibri"/>
-                <a:cs typeface="Calibri"/>
-                <a:sym typeface="Calibri"/>
-              </a:rPr>
-              <a:t> </a:t>
-            </a:r>
-            <a:r>
-              <a:rPr lang="en-US" sz="1800">
-                <a:solidFill>
-                  <a:srgbClr val="C00000"/>
-                </a:solidFill>
-                <a:latin typeface="Calibri"/>
-                <a:ea typeface="Calibri"/>
-                <a:cs typeface="Calibri"/>
-                <a:sym typeface="Calibri"/>
-              </a:rPr>
-              <a:t>Random Forest Classifer</a:t>
+              <a:t>Logistic Regression</a:t>
             </a:r>
             <a:r>
               <a:rPr b="0" i="0" lang="en-US" sz="1800" u="none" cap="none" strike="noStrike">
@@ -18895,7 +18874,7 @@
   <p:cSld>
     <p:spTree>
       <p:nvGrpSpPr>
-        <p:cNvPr id="194" name="Shape 194"/>
+        <p:cNvPr id="195" name="Shape 195"/>
         <p:cNvGrpSpPr/>
         <p:nvPr/>
       </p:nvGrpSpPr>
@@ -18909,7 +18888,7 @@
       </p:grpSpPr>
       <p:sp>
         <p:nvSpPr>
-          <p:cNvPr id="195" name="Google Shape;195;p25"/>
+          <p:cNvPr id="196" name="Google Shape;196;p25"/>
           <p:cNvSpPr txBox="1"/>
           <p:nvPr>
             <p:ph idx="1" type="subTitle"/>
@@ -18990,7 +18969,7 @@
       </p:sp>
       <p:sp>
         <p:nvSpPr>
-          <p:cNvPr id="196" name="Google Shape;196;p25"/>
+          <p:cNvPr id="197" name="Google Shape;197;p25"/>
           <p:cNvSpPr/>
           <p:nvPr/>
         </p:nvSpPr>
@@ -19055,7 +19034,7 @@
       </p:sp>
       <p:pic>
         <p:nvPicPr>
-          <p:cNvPr id="197" name="Google Shape;197;p25"/>
+          <p:cNvPr id="198" name="Google Shape;198;p25"/>
           <p:cNvPicPr preferRelativeResize="0"/>
           <p:nvPr/>
         </p:nvPicPr>
@@ -23797,6 +23776,285 @@
 </file>
 
 <file path=ppt/theme/theme1.xml><?xml version="1.0" encoding="utf-8"?>
+<a:theme xmlns:a="http://schemas.openxmlformats.org/drawingml/2006/main" xmlns:r="http://schemas.openxmlformats.org/officeDocument/2006/relationships" name="Office Theme">
+  <a:themeElements>
+    <a:clrScheme name="Office">
+      <a:dk1>
+        <a:srgbClr val="000000"/>
+      </a:dk1>
+      <a:lt1>
+        <a:srgbClr val="FFFFFF"/>
+      </a:lt1>
+      <a:dk2>
+        <a:srgbClr val="44546A"/>
+      </a:dk2>
+      <a:lt2>
+        <a:srgbClr val="E7E6E6"/>
+      </a:lt2>
+      <a:accent1>
+        <a:srgbClr val="4472C4"/>
+      </a:accent1>
+      <a:accent2>
+        <a:srgbClr val="ED7D31"/>
+      </a:accent2>
+      <a:accent3>
+        <a:srgbClr val="A5A5A5"/>
+      </a:accent3>
+      <a:accent4>
+        <a:srgbClr val="FFC000"/>
+      </a:accent4>
+      <a:accent5>
+        <a:srgbClr val="5B9BD5"/>
+      </a:accent5>
+      <a:accent6>
+        <a:srgbClr val="70AD47"/>
+      </a:accent6>
+      <a:hlink>
+        <a:srgbClr val="0563C1"/>
+      </a:hlink>
+      <a:folHlink>
+        <a:srgbClr val="954F72"/>
+      </a:folHlink>
+    </a:clrScheme>
+    <a:fontScheme name="Office">
+      <a:majorFont>
+        <a:latin typeface="Arial"/>
+        <a:ea typeface=""/>
+        <a:cs typeface=""/>
+        <a:font script="Jpan" typeface="ＭＳ Ｐゴシック"/>
+        <a:font script="Hang" typeface="맑은 고딕"/>
+        <a:font script="Hans" typeface="宋体"/>
+        <a:font script="Hant" typeface="新細明體"/>
+        <a:font script="Arab" typeface="Times New Roman"/>
+        <a:font script="Hebr" typeface="Times New Roman"/>
+        <a:font script="Thai" typeface="Angsana New"/>
+        <a:font script="Ethi" typeface="Nyala"/>
+        <a:font script="Beng" typeface="Vrinda"/>
+        <a:font script="Gujr" typeface="Shruti"/>
+        <a:font script="Khmr" typeface="MoolBoran"/>
+        <a:font script="Knda" typeface="Tunga"/>
+        <a:font script="Guru" typeface="Raavi"/>
+        <a:font script="Cans" typeface="Euphemia"/>
+        <a:font script="Cher" typeface="Plantagenet Cherokee"/>
+        <a:font script="Yiii" typeface="Microsoft Yi Baiti"/>
+        <a:font script="Tibt" typeface="Microsoft Himalaya"/>
+        <a:font script="Thaa" typeface="MV Boli"/>
+        <a:font script="Deva" typeface="Mangal"/>
+        <a:font script="Telu" typeface="Gautami"/>
+        <a:font script="Taml" typeface="Latha"/>
+        <a:font script="Syrc" typeface="Estrangelo Edessa"/>
+        <a:font script="Orya" typeface="Kalinga"/>
+        <a:font script="Mlym" typeface="Kartika"/>
+        <a:font script="Laoo" typeface="DokChampa"/>
+        <a:font script="Sinh" typeface="Iskoola Pota"/>
+        <a:font script="Mong" typeface="Mongolian Baiti"/>
+        <a:font script="Viet" typeface="Times New Roman"/>
+        <a:font script="Uigh" typeface="Microsoft Uighur"/>
+        <a:font script="Geor" typeface="Sylfaen"/>
+      </a:majorFont>
+      <a:minorFont>
+        <a:latin typeface="Arial"/>
+        <a:ea typeface=""/>
+        <a:cs typeface=""/>
+        <a:font script="Jpan" typeface="ＭＳ Ｐゴシック"/>
+        <a:font script="Hang" typeface="맑은 고딕"/>
+        <a:font script="Hans" typeface="宋体"/>
+        <a:font script="Hant" typeface="新細明體"/>
+        <a:font script="Arab" typeface="Arial"/>
+        <a:font script="Hebr" typeface="Arial"/>
+        <a:font script="Thai" typeface="Cordia New"/>
+        <a:font script="Ethi" typeface="Nyala"/>
+        <a:font script="Beng" typeface="Vrinda"/>
+        <a:font script="Gujr" typeface="Shruti"/>
+        <a:font script="Khmr" typeface="DaunPenh"/>
+        <a:font script="Knda" typeface="Tunga"/>
+        <a:font script="Guru" typeface="Raavi"/>
+        <a:font script="Cans" typeface="Euphemia"/>
+        <a:font script="Cher" typeface="Plantagenet Cherokee"/>
+        <a:font script="Yiii" typeface="Microsoft Yi Baiti"/>
+        <a:font script="Tibt" typeface="Microsoft Himalaya"/>
+        <a:font script="Thaa" typeface="MV Boli"/>
+        <a:font script="Deva" typeface="Mangal"/>
+        <a:font script="Telu" typeface="Gautami"/>
+        <a:font script="Taml" typeface="Latha"/>
+        <a:font script="Syrc" typeface="Estrangelo Edessa"/>
+        <a:font script="Orya" typeface="Kalinga"/>
+        <a:font script="Mlym" typeface="Kartika"/>
+        <a:font script="Laoo" typeface="DokChampa"/>
+        <a:font script="Sinh" typeface="Iskoola Pota"/>
+        <a:font script="Mong" typeface="Mongolian Baiti"/>
+        <a:font script="Viet" typeface="Arial"/>
+        <a:font script="Uigh" typeface="Microsoft Uighur"/>
+        <a:font script="Geor" typeface="Sylfaen"/>
+      </a:minorFont>
+    </a:fontScheme>
+    <a:fmtScheme name="Office">
+      <a:fillStyleLst>
+        <a:solidFill>
+          <a:schemeClr val="phClr"/>
+        </a:solidFill>
+        <a:gradFill rotWithShape="1">
+          <a:gsLst>
+            <a:gs pos="0">
+              <a:schemeClr val="phClr">
+                <a:tint val="50000"/>
+                <a:satMod val="300000"/>
+              </a:schemeClr>
+            </a:gs>
+            <a:gs pos="35000">
+              <a:schemeClr val="phClr">
+                <a:tint val="37000"/>
+                <a:satMod val="300000"/>
+              </a:schemeClr>
+            </a:gs>
+            <a:gs pos="100000">
+              <a:schemeClr val="phClr">
+                <a:tint val="15000"/>
+                <a:satMod val="350000"/>
+              </a:schemeClr>
+            </a:gs>
+          </a:gsLst>
+          <a:lin ang="16200000" scaled="1"/>
+        </a:gradFill>
+        <a:gradFill rotWithShape="1">
+          <a:gsLst>
+            <a:gs pos="0">
+              <a:schemeClr val="phClr">
+                <a:tint val="100000"/>
+                <a:shade val="100000"/>
+                <a:satMod val="130000"/>
+              </a:schemeClr>
+            </a:gs>
+            <a:gs pos="100000">
+              <a:schemeClr val="phClr">
+                <a:tint val="50000"/>
+                <a:shade val="100000"/>
+                <a:satMod val="350000"/>
+              </a:schemeClr>
+            </a:gs>
+          </a:gsLst>
+          <a:lin ang="16200000" scaled="0"/>
+        </a:gradFill>
+      </a:fillStyleLst>
+      <a:lnStyleLst>
+        <a:ln w="9525" cap="flat" cmpd="sng" algn="ctr">
+          <a:solidFill>
+            <a:schemeClr val="phClr">
+              <a:shade val="95000"/>
+              <a:satMod val="105000"/>
+            </a:schemeClr>
+          </a:solidFill>
+          <a:prstDash val="solid"/>
+        </a:ln>
+        <a:ln w="25400" cap="flat" cmpd="sng" algn="ctr">
+          <a:solidFill>
+            <a:schemeClr val="phClr"/>
+          </a:solidFill>
+          <a:prstDash val="solid"/>
+        </a:ln>
+        <a:ln w="38100" cap="flat" cmpd="sng" algn="ctr">
+          <a:solidFill>
+            <a:schemeClr val="phClr"/>
+          </a:solidFill>
+          <a:prstDash val="solid"/>
+        </a:ln>
+      </a:lnStyleLst>
+      <a:effectStyleLst>
+        <a:effectStyle>
+          <a:effectLst>
+            <a:outerShdw blurRad="40000" dist="20000" dir="5400000" rotWithShape="0">
+              <a:srgbClr val="000000">
+                <a:alpha val="38000"/>
+              </a:srgbClr>
+            </a:outerShdw>
+          </a:effectLst>
+        </a:effectStyle>
+        <a:effectStyle>
+          <a:effectLst>
+            <a:outerShdw blurRad="40000" dist="23000" dir="5400000" rotWithShape="0">
+              <a:srgbClr val="000000">
+                <a:alpha val="35000"/>
+              </a:srgbClr>
+            </a:outerShdw>
+          </a:effectLst>
+        </a:effectStyle>
+        <a:effectStyle>
+          <a:effectLst>
+            <a:outerShdw blurRad="40000" dist="23000" dir="5400000" rotWithShape="0">
+              <a:srgbClr val="000000">
+                <a:alpha val="35000"/>
+              </a:srgbClr>
+            </a:outerShdw>
+          </a:effectLst>
+          <a:scene3d>
+            <a:camera prst="orthographicFront">
+              <a:rot lat="0" lon="0" rev="0"/>
+            </a:camera>
+            <a:lightRig rig="threePt" dir="t">
+              <a:rot lat="0" lon="0" rev="1200000"/>
+            </a:lightRig>
+          </a:scene3d>
+          <a:sp3d>
+            <a:bevelT w="63500" h="25400"/>
+          </a:sp3d>
+        </a:effectStyle>
+      </a:effectStyleLst>
+      <a:bgFillStyleLst>
+        <a:solidFill>
+          <a:schemeClr val="phClr"/>
+        </a:solidFill>
+        <a:gradFill rotWithShape="1">
+          <a:gsLst>
+            <a:gs pos="0">
+              <a:schemeClr val="phClr">
+                <a:tint val="40000"/>
+                <a:satMod val="350000"/>
+              </a:schemeClr>
+            </a:gs>
+            <a:gs pos="40000">
+              <a:schemeClr val="phClr">
+                <a:tint val="45000"/>
+                <a:shade val="99000"/>
+                <a:satMod val="350000"/>
+              </a:schemeClr>
+            </a:gs>
+            <a:gs pos="100000">
+              <a:schemeClr val="phClr">
+                <a:shade val="20000"/>
+                <a:satMod val="255000"/>
+              </a:schemeClr>
+            </a:gs>
+          </a:gsLst>
+          <a:path path="circle">
+            <a:fillToRect l="50000" t="-80000" r="50000" b="180000"/>
+          </a:path>
+        </a:gradFill>
+        <a:gradFill rotWithShape="1">
+          <a:gsLst>
+            <a:gs pos="0">
+              <a:schemeClr val="phClr">
+                <a:tint val="80000"/>
+                <a:satMod val="300000"/>
+              </a:schemeClr>
+            </a:gs>
+            <a:gs pos="100000">
+              <a:schemeClr val="phClr">
+                <a:shade val="30000"/>
+                <a:satMod val="200000"/>
+              </a:schemeClr>
+            </a:gs>
+          </a:gsLst>
+          <a:path path="circle">
+            <a:fillToRect l="50000" t="50000" r="50000" b="50000"/>
+          </a:path>
+        </a:gradFill>
+      </a:bgFillStyleLst>
+    </a:fmtScheme>
+  </a:themeElements>
+</a:theme>
+</file>
+
+<file path=ppt/theme/theme2.xml><?xml version="1.0" encoding="utf-8"?>
 <a:theme xmlns:a="http://schemas.openxmlformats.org/drawingml/2006/main" xmlns:r="http://schemas.openxmlformats.org/officeDocument/2006/relationships">
   <a:themeElements>
     <a:clrScheme name="Default">
@@ -24073,283 +24331,4 @@
     </a:fmtScheme>
   </a:themeElements>
 </a:theme>
-</file>
-
-<file path=ppt/theme/theme2.xml><?xml version="1.0" encoding="utf-8"?>
-<a:theme xmlns:a="http://schemas.openxmlformats.org/drawingml/2006/main" xmlns:r="http://schemas.openxmlformats.org/officeDocument/2006/relationships" name="Office Theme">
-  <a:themeElements>
-    <a:clrScheme name="Office">
-      <a:dk1>
-        <a:srgbClr val="000000"/>
-      </a:dk1>
-      <a:lt1>
-        <a:srgbClr val="FFFFFF"/>
-      </a:lt1>
-      <a:dk2>
-        <a:srgbClr val="44546A"/>
-      </a:dk2>
-      <a:lt2>
-        <a:srgbClr val="E7E6E6"/>
-      </a:lt2>
-      <a:accent1>
-        <a:srgbClr val="4472C4"/>
-      </a:accent1>
-      <a:accent2>
-        <a:srgbClr val="ED7D31"/>
-      </a:accent2>
-      <a:accent3>
-        <a:srgbClr val="A5A5A5"/>
-      </a:accent3>
-      <a:accent4>
-        <a:srgbClr val="FFC000"/>
-      </a:accent4>
-      <a:accent5>
-        <a:srgbClr val="5B9BD5"/>
-      </a:accent5>
-      <a:accent6>
-        <a:srgbClr val="70AD47"/>
-      </a:accent6>
-      <a:hlink>
-        <a:srgbClr val="0563C1"/>
-      </a:hlink>
-      <a:folHlink>
-        <a:srgbClr val="954F72"/>
-      </a:folHlink>
-    </a:clrScheme>
-    <a:fontScheme name="Office">
-      <a:majorFont>
-        <a:latin typeface="Arial"/>
-        <a:ea typeface=""/>
-        <a:cs typeface=""/>
-        <a:font script="Jpan" typeface="ＭＳ Ｐゴシック"/>
-        <a:font script="Hang" typeface="맑은 고딕"/>
-        <a:font script="Hans" typeface="宋体"/>
-        <a:font script="Hant" typeface="新細明體"/>
-        <a:font script="Arab" typeface="Times New Roman"/>
-        <a:font script="Hebr" typeface="Times New Roman"/>
-        <a:font script="Thai" typeface="Angsana New"/>
-        <a:font script="Ethi" typeface="Nyala"/>
-        <a:font script="Beng" typeface="Vrinda"/>
-        <a:font script="Gujr" typeface="Shruti"/>
-        <a:font script="Khmr" typeface="MoolBoran"/>
-        <a:font script="Knda" typeface="Tunga"/>
-        <a:font script="Guru" typeface="Raavi"/>
-        <a:font script="Cans" typeface="Euphemia"/>
-        <a:font script="Cher" typeface="Plantagenet Cherokee"/>
-        <a:font script="Yiii" typeface="Microsoft Yi Baiti"/>
-        <a:font script="Tibt" typeface="Microsoft Himalaya"/>
-        <a:font script="Thaa" typeface="MV Boli"/>
-        <a:font script="Deva" typeface="Mangal"/>
-        <a:font script="Telu" typeface="Gautami"/>
-        <a:font script="Taml" typeface="Latha"/>
-        <a:font script="Syrc" typeface="Estrangelo Edessa"/>
-        <a:font script="Orya" typeface="Kalinga"/>
-        <a:font script="Mlym" typeface="Kartika"/>
-        <a:font script="Laoo" typeface="DokChampa"/>
-        <a:font script="Sinh" typeface="Iskoola Pota"/>
-        <a:font script="Mong" typeface="Mongolian Baiti"/>
-        <a:font script="Viet" typeface="Times New Roman"/>
-        <a:font script="Uigh" typeface="Microsoft Uighur"/>
-        <a:font script="Geor" typeface="Sylfaen"/>
-      </a:majorFont>
-      <a:minorFont>
-        <a:latin typeface="Arial"/>
-        <a:ea typeface=""/>
-        <a:cs typeface=""/>
-        <a:font script="Jpan" typeface="ＭＳ Ｐゴシック"/>
-        <a:font script="Hang" typeface="맑은 고딕"/>
-        <a:font script="Hans" typeface="宋体"/>
-        <a:font script="Hant" typeface="新細明體"/>
-        <a:font script="Arab" typeface="Arial"/>
-        <a:font script="Hebr" typeface="Arial"/>
-        <a:font script="Thai" typeface="Cordia New"/>
-        <a:font script="Ethi" typeface="Nyala"/>
-        <a:font script="Beng" typeface="Vrinda"/>
-        <a:font script="Gujr" typeface="Shruti"/>
-        <a:font script="Khmr" typeface="DaunPenh"/>
-        <a:font script="Knda" typeface="Tunga"/>
-        <a:font script="Guru" typeface="Raavi"/>
-        <a:font script="Cans" typeface="Euphemia"/>
-        <a:font script="Cher" typeface="Plantagenet Cherokee"/>
-        <a:font script="Yiii" typeface="Microsoft Yi Baiti"/>
-        <a:font script="Tibt" typeface="Microsoft Himalaya"/>
-        <a:font script="Thaa" typeface="MV Boli"/>
-        <a:font script="Deva" typeface="Mangal"/>
-        <a:font script="Telu" typeface="Gautami"/>
-        <a:font script="Taml" typeface="Latha"/>
-        <a:font script="Syrc" typeface="Estrangelo Edessa"/>
-        <a:font script="Orya" typeface="Kalinga"/>
-        <a:font script="Mlym" typeface="Kartika"/>
-        <a:font script="Laoo" typeface="DokChampa"/>
-        <a:font script="Sinh" typeface="Iskoola Pota"/>
-        <a:font script="Mong" typeface="Mongolian Baiti"/>
-        <a:font script="Viet" typeface="Arial"/>
-        <a:font script="Uigh" typeface="Microsoft Uighur"/>
-        <a:font script="Geor" typeface="Sylfaen"/>
-      </a:minorFont>
-    </a:fontScheme>
-    <a:fmtScheme name="Office">
-      <a:fillStyleLst>
-        <a:solidFill>
-          <a:schemeClr val="phClr"/>
-        </a:solidFill>
-        <a:gradFill rotWithShape="1">
-          <a:gsLst>
-            <a:gs pos="0">
-              <a:schemeClr val="phClr">
-                <a:tint val="50000"/>
-                <a:satMod val="300000"/>
-              </a:schemeClr>
-            </a:gs>
-            <a:gs pos="35000">
-              <a:schemeClr val="phClr">
-                <a:tint val="37000"/>
-                <a:satMod val="300000"/>
-              </a:schemeClr>
-            </a:gs>
-            <a:gs pos="100000">
-              <a:schemeClr val="phClr">
-                <a:tint val="15000"/>
-                <a:satMod val="350000"/>
-              </a:schemeClr>
-            </a:gs>
-          </a:gsLst>
-          <a:lin ang="16200000" scaled="1"/>
-        </a:gradFill>
-        <a:gradFill rotWithShape="1">
-          <a:gsLst>
-            <a:gs pos="0">
-              <a:schemeClr val="phClr">
-                <a:tint val="100000"/>
-                <a:shade val="100000"/>
-                <a:satMod val="130000"/>
-              </a:schemeClr>
-            </a:gs>
-            <a:gs pos="100000">
-              <a:schemeClr val="phClr">
-                <a:tint val="50000"/>
-                <a:shade val="100000"/>
-                <a:satMod val="350000"/>
-              </a:schemeClr>
-            </a:gs>
-          </a:gsLst>
-          <a:lin ang="16200000" scaled="0"/>
-        </a:gradFill>
-      </a:fillStyleLst>
-      <a:lnStyleLst>
-        <a:ln w="9525" cap="flat" cmpd="sng" algn="ctr">
-          <a:solidFill>
-            <a:schemeClr val="phClr">
-              <a:shade val="95000"/>
-              <a:satMod val="105000"/>
-            </a:schemeClr>
-          </a:solidFill>
-          <a:prstDash val="solid"/>
-        </a:ln>
-        <a:ln w="25400" cap="flat" cmpd="sng" algn="ctr">
-          <a:solidFill>
-            <a:schemeClr val="phClr"/>
-          </a:solidFill>
-          <a:prstDash val="solid"/>
-        </a:ln>
-        <a:ln w="38100" cap="flat" cmpd="sng" algn="ctr">
-          <a:solidFill>
-            <a:schemeClr val="phClr"/>
-          </a:solidFill>
-          <a:prstDash val="solid"/>
-        </a:ln>
-      </a:lnStyleLst>
-      <a:effectStyleLst>
-        <a:effectStyle>
-          <a:effectLst>
-            <a:outerShdw blurRad="40000" dist="20000" dir="5400000" rotWithShape="0">
-              <a:srgbClr val="000000">
-                <a:alpha val="38000"/>
-              </a:srgbClr>
-            </a:outerShdw>
-          </a:effectLst>
-        </a:effectStyle>
-        <a:effectStyle>
-          <a:effectLst>
-            <a:outerShdw blurRad="40000" dist="23000" dir="5400000" rotWithShape="0">
-              <a:srgbClr val="000000">
-                <a:alpha val="35000"/>
-              </a:srgbClr>
-            </a:outerShdw>
-          </a:effectLst>
-        </a:effectStyle>
-        <a:effectStyle>
-          <a:effectLst>
-            <a:outerShdw blurRad="40000" dist="23000" dir="5400000" rotWithShape="0">
-              <a:srgbClr val="000000">
-                <a:alpha val="35000"/>
-              </a:srgbClr>
-            </a:outerShdw>
-          </a:effectLst>
-          <a:scene3d>
-            <a:camera prst="orthographicFront">
-              <a:rot lat="0" lon="0" rev="0"/>
-            </a:camera>
-            <a:lightRig rig="threePt" dir="t">
-              <a:rot lat="0" lon="0" rev="1200000"/>
-            </a:lightRig>
-          </a:scene3d>
-          <a:sp3d>
-            <a:bevelT w="63500" h="25400"/>
-          </a:sp3d>
-        </a:effectStyle>
-      </a:effectStyleLst>
-      <a:bgFillStyleLst>
-        <a:solidFill>
-          <a:schemeClr val="phClr"/>
-        </a:solidFill>
-        <a:gradFill rotWithShape="1">
-          <a:gsLst>
-            <a:gs pos="0">
-              <a:schemeClr val="phClr">
-                <a:tint val="40000"/>
-                <a:satMod val="350000"/>
-              </a:schemeClr>
-            </a:gs>
-            <a:gs pos="40000">
-              <a:schemeClr val="phClr">
-                <a:tint val="45000"/>
-                <a:shade val="99000"/>
-                <a:satMod val="350000"/>
-              </a:schemeClr>
-            </a:gs>
-            <a:gs pos="100000">
-              <a:schemeClr val="phClr">
-                <a:shade val="20000"/>
-                <a:satMod val="255000"/>
-              </a:schemeClr>
-            </a:gs>
-          </a:gsLst>
-          <a:path path="circle">
-            <a:fillToRect l="50000" t="-80000" r="50000" b="180000"/>
-          </a:path>
-        </a:gradFill>
-        <a:gradFill rotWithShape="1">
-          <a:gsLst>
-            <a:gs pos="0">
-              <a:schemeClr val="phClr">
-                <a:tint val="80000"/>
-                <a:satMod val="300000"/>
-              </a:schemeClr>
-            </a:gs>
-            <a:gs pos="100000">
-              <a:schemeClr val="phClr">
-                <a:shade val="30000"/>
-                <a:satMod val="200000"/>
-              </a:schemeClr>
-            </a:gs>
-          </a:gsLst>
-          <a:path path="circle">
-            <a:fillToRect l="50000" t="50000" r="50000" b="50000"/>
-          </a:path>
-        </a:gradFill>
-      </a:bgFillStyleLst>
-    </a:fmtScheme>
-  </a:themeElements>
-</a:theme>
 </file>
</xml_diff>